<commit_message>
Added USTTL Sunum file
</commit_message>
<xml_diff>
--- a/Documents/Memory Calculation.pptx
+++ b/Documents/Memory Calculation.pptx
@@ -266,7 +266,7 @@
           <a:p>
             <a:fld id="{3A4F6CC5-A051-42B7-8A06-E5A87266463D}" type="datetimeFigureOut">
               <a:rPr lang="en-US" smtClean="0"/>
-              <a:t>11/28/2022</a:t>
+              <a:t>12/3/2022</a:t>
             </a:fld>
             <a:endParaRPr lang="en-US"/>
           </a:p>
@@ -464,7 +464,7 @@
           <a:p>
             <a:fld id="{3A4F6CC5-A051-42B7-8A06-E5A87266463D}" type="datetimeFigureOut">
               <a:rPr lang="en-US" smtClean="0"/>
-              <a:t>11/28/2022</a:t>
+              <a:t>12/3/2022</a:t>
             </a:fld>
             <a:endParaRPr lang="en-US"/>
           </a:p>
@@ -672,7 +672,7 @@
           <a:p>
             <a:fld id="{3A4F6CC5-A051-42B7-8A06-E5A87266463D}" type="datetimeFigureOut">
               <a:rPr lang="en-US" smtClean="0"/>
-              <a:t>11/28/2022</a:t>
+              <a:t>12/3/2022</a:t>
             </a:fld>
             <a:endParaRPr lang="en-US"/>
           </a:p>
@@ -870,7 +870,7 @@
           <a:p>
             <a:fld id="{3A4F6CC5-A051-42B7-8A06-E5A87266463D}" type="datetimeFigureOut">
               <a:rPr lang="en-US" smtClean="0"/>
-              <a:t>11/28/2022</a:t>
+              <a:t>12/3/2022</a:t>
             </a:fld>
             <a:endParaRPr lang="en-US"/>
           </a:p>
@@ -1145,7 +1145,7 @@
           <a:p>
             <a:fld id="{3A4F6CC5-A051-42B7-8A06-E5A87266463D}" type="datetimeFigureOut">
               <a:rPr lang="en-US" smtClean="0"/>
-              <a:t>11/28/2022</a:t>
+              <a:t>12/3/2022</a:t>
             </a:fld>
             <a:endParaRPr lang="en-US"/>
           </a:p>
@@ -1410,7 +1410,7 @@
           <a:p>
             <a:fld id="{3A4F6CC5-A051-42B7-8A06-E5A87266463D}" type="datetimeFigureOut">
               <a:rPr lang="en-US" smtClean="0"/>
-              <a:t>11/28/2022</a:t>
+              <a:t>12/3/2022</a:t>
             </a:fld>
             <a:endParaRPr lang="en-US"/>
           </a:p>
@@ -1822,7 +1822,7 @@
           <a:p>
             <a:fld id="{3A4F6CC5-A051-42B7-8A06-E5A87266463D}" type="datetimeFigureOut">
               <a:rPr lang="en-US" smtClean="0"/>
-              <a:t>11/28/2022</a:t>
+              <a:t>12/3/2022</a:t>
             </a:fld>
             <a:endParaRPr lang="en-US"/>
           </a:p>
@@ -1963,7 +1963,7 @@
           <a:p>
             <a:fld id="{3A4F6CC5-A051-42B7-8A06-E5A87266463D}" type="datetimeFigureOut">
               <a:rPr lang="en-US" smtClean="0"/>
-              <a:t>11/28/2022</a:t>
+              <a:t>12/3/2022</a:t>
             </a:fld>
             <a:endParaRPr lang="en-US"/>
           </a:p>
@@ -2076,7 +2076,7 @@
           <a:p>
             <a:fld id="{3A4F6CC5-A051-42B7-8A06-E5A87266463D}" type="datetimeFigureOut">
               <a:rPr lang="en-US" smtClean="0"/>
-              <a:t>11/28/2022</a:t>
+              <a:t>12/3/2022</a:t>
             </a:fld>
             <a:endParaRPr lang="en-US"/>
           </a:p>
@@ -2387,7 +2387,7 @@
           <a:p>
             <a:fld id="{3A4F6CC5-A051-42B7-8A06-E5A87266463D}" type="datetimeFigureOut">
               <a:rPr lang="en-US" smtClean="0"/>
-              <a:t>11/28/2022</a:t>
+              <a:t>12/3/2022</a:t>
             </a:fld>
             <a:endParaRPr lang="en-US"/>
           </a:p>
@@ -2675,7 +2675,7 @@
           <a:p>
             <a:fld id="{3A4F6CC5-A051-42B7-8A06-E5A87266463D}" type="datetimeFigureOut">
               <a:rPr lang="en-US" smtClean="0"/>
-              <a:t>11/28/2022</a:t>
+              <a:t>12/3/2022</a:t>
             </a:fld>
             <a:endParaRPr lang="en-US"/>
           </a:p>
@@ -2916,7 +2916,7 @@
           <a:p>
             <a:fld id="{3A4F6CC5-A051-42B7-8A06-E5A87266463D}" type="datetimeFigureOut">
               <a:rPr lang="en-US" smtClean="0"/>
-              <a:t>11/28/2022</a:t>
+              <a:t>12/3/2022</a:t>
             </a:fld>
             <a:endParaRPr lang="en-US"/>
           </a:p>

</xml_diff>